<commit_message>
Finalized the resttemplate and other configuration
Finalized the resttemplate and other configuration
</commit_message>
<xml_diff>
--- a/Documents/WebStore Presentation.pptx
+++ b/Documents/WebStore Presentation.pptx
@@ -25,13 +25,15 @@
     <p:sldId id="274" r:id="rId19"/>
     <p:sldId id="275" r:id="rId20"/>
     <p:sldId id="279" r:id="rId21"/>
-    <p:sldId id="278" r:id="rId22"/>
-    <p:sldId id="280" r:id="rId23"/>
-    <p:sldId id="276" r:id="rId24"/>
-    <p:sldId id="277" r:id="rId25"/>
-    <p:sldId id="281" r:id="rId26"/>
-    <p:sldId id="282" r:id="rId27"/>
-    <p:sldId id="283" r:id="rId28"/>
+    <p:sldId id="284" r:id="rId22"/>
+    <p:sldId id="278" r:id="rId23"/>
+    <p:sldId id="280" r:id="rId24"/>
+    <p:sldId id="276" r:id="rId25"/>
+    <p:sldId id="277" r:id="rId26"/>
+    <p:sldId id="281" r:id="rId27"/>
+    <p:sldId id="282" r:id="rId28"/>
+    <p:sldId id="286" r:id="rId29"/>
+    <p:sldId id="283" r:id="rId30"/>
   </p:sldIdLst>
   <p:sldSz cx="12192000" cy="6858000"/>
   <p:notesSz cx="6858000" cy="9144000"/>
@@ -3442,7 +3444,7 @@
                 <a:latin typeface="Arial" pitchFamily="34" charset="0"/>
                 <a:cs typeface="Arial" pitchFamily="34" charset="0"/>
               </a:rPr>
-              <a:t>Tavaki</a:t>
+              <a:t>Tavakoli</a:t>
             </a:r>
             <a:br>
               <a:rPr lang="en-US" sz="1800" b="1" dirty="0">
@@ -6928,36 +6930,29 @@
             <p:ph type="title"/>
           </p:nvPr>
         </p:nvSpPr>
-        <p:spPr>
-          <a:xfrm>
-            <a:off x="838200" y="170330"/>
-            <a:ext cx="4719918" cy="795864"/>
-          </a:xfrm>
-        </p:spPr>
-        <p:txBody>
-          <a:bodyPr>
-            <a:noAutofit/>
-          </a:bodyPr>
-          <a:lstStyle/>
-          <a:p>
-            <a:r>
-              <a:rPr lang="en-US" sz="3600" dirty="0">
+        <p:spPr/>
+        <p:txBody>
+          <a:bodyPr/>
+          <a:lstStyle/>
+          <a:p>
+            <a:r>
+              <a:rPr lang="en-US" sz="4400" dirty="0">
                 <a:solidFill>
                   <a:schemeClr val="accent6"/>
                 </a:solidFill>
               </a:rPr>
-              <a:t>Cart Service (Command)</a:t>
-            </a:r>
-            <a:endParaRPr lang="en-US" sz="3600" dirty="0"/>
-          </a:p>
-        </p:txBody>
-      </p:sp>
-      <p:sp>
-        <p:nvSpPr>
-          <p:cNvPr id="5" name="Content Placeholder 2">
-            <a:extLst>
-              <a:ext uri="{FF2B5EF4-FFF2-40B4-BE49-F238E27FC236}">
-                <a16:creationId xmlns:a16="http://schemas.microsoft.com/office/drawing/2014/main" id="{4C5ED415-8458-4E30-A89C-CFD27D8227AD}"/>
+              <a:t>Challenges</a:t>
+            </a:r>
+            <a:endParaRPr lang="en-US" dirty="0"/>
+          </a:p>
+        </p:txBody>
+      </p:sp>
+      <p:sp>
+        <p:nvSpPr>
+          <p:cNvPr id="3" name="Content Placeholder 2">
+            <a:extLst>
+              <a:ext uri="{FF2B5EF4-FFF2-40B4-BE49-F238E27FC236}">
+                <a16:creationId xmlns:a16="http://schemas.microsoft.com/office/drawing/2014/main" id="{D4869074-D919-42B4-9B29-F3C083D06B65}"/>
               </a:ext>
             </a:extLst>
           </p:cNvPr>
@@ -6970,122 +6965,81 @@
         </p:nvSpPr>
         <p:spPr>
           <a:xfrm>
-            <a:off x="838200" y="1161771"/>
-            <a:ext cx="5508812" cy="1303523"/>
+            <a:off x="838200" y="1690688"/>
+            <a:ext cx="10515600" cy="4486275"/>
           </a:xfrm>
         </p:spPr>
         <p:txBody>
           <a:bodyPr>
-            <a:normAutofit fontScale="92500" lnSpcReduction="20000"/>
+            <a:normAutofit/>
           </a:bodyPr>
           <a:lstStyle/>
           <a:p>
             <a:r>
-              <a:rPr lang="en-US" sz="1800" dirty="0"/>
-              <a:t>Service to handle </a:t>
+              <a:rPr lang="en-US" sz="1600" dirty="0"/>
+              <a:t>Kafka</a:t>
             </a:r>
           </a:p>
           <a:p>
             <a:pPr lvl="1"/>
             <a:r>
-              <a:rPr lang="en-US" sz="1400" dirty="0"/>
-              <a:t>Add product</a:t>
+              <a:rPr lang="en-US" sz="1200" dirty="0"/>
+              <a:t>We had faces challenges in syncing the object between Producer and Consumer</a:t>
             </a:r>
           </a:p>
           <a:p>
             <a:pPr lvl="1"/>
             <a:r>
-              <a:rPr lang="en-US" sz="1400" dirty="0"/>
-              <a:t>Remove product</a:t>
+              <a:rPr lang="en-US" sz="1200" dirty="0"/>
+              <a:t>For solution, we had used the string message, which is the </a:t>
+            </a:r>
+            <a:r>
+              <a:rPr lang="en-US" sz="1200" dirty="0" err="1"/>
+              <a:t>json</a:t>
+            </a:r>
+            <a:r>
+              <a:rPr lang="en-US" sz="1200" dirty="0"/>
+              <a:t> format of the object</a:t>
+            </a:r>
+          </a:p>
+          <a:p>
+            <a:r>
+              <a:rPr lang="en-US" sz="1600" dirty="0"/>
+              <a:t>ELK:</a:t>
             </a:r>
           </a:p>
           <a:p>
             <a:pPr lvl="1"/>
             <a:r>
-              <a:rPr lang="en-US" sz="1400" dirty="0"/>
-              <a:t>Change quantity</a:t>
+              <a:rPr lang="en-US" sz="1200" dirty="0"/>
+              <a:t>We tried to configured the ELK in project</a:t>
             </a:r>
           </a:p>
           <a:p>
             <a:pPr lvl="1"/>
             <a:r>
-              <a:rPr lang="en-US" sz="1400" dirty="0"/>
-              <a:t>Checkout cart</a:t>
-            </a:r>
-          </a:p>
-          <a:p>
-            <a:pPr lvl="1"/>
-            <a:r>
-              <a:rPr lang="en-US" sz="1400" dirty="0"/>
-              <a:t>On checkout it produces the event</a:t>
-            </a:r>
-          </a:p>
-        </p:txBody>
-      </p:sp>
-      <p:pic>
-        <p:nvPicPr>
-          <p:cNvPr id="4" name="Picture 3">
-            <a:extLst>
-              <a:ext uri="{FF2B5EF4-FFF2-40B4-BE49-F238E27FC236}">
-                <a16:creationId xmlns:a16="http://schemas.microsoft.com/office/drawing/2014/main" id="{0729A4C3-3896-4EC8-8692-502C5CB0241C}"/>
-              </a:ext>
-            </a:extLst>
-          </p:cNvPr>
-          <p:cNvPicPr>
-            <a:picLocks noChangeAspect="1"/>
-          </p:cNvPicPr>
-          <p:nvPr/>
-        </p:nvPicPr>
-        <p:blipFill>
-          <a:blip r:embed="rId2"/>
-          <a:stretch>
-            <a:fillRect/>
-          </a:stretch>
-        </p:blipFill>
-        <p:spPr>
-          <a:xfrm>
-            <a:off x="5744136" y="251292"/>
-            <a:ext cx="5867400" cy="5172075"/>
-          </a:xfrm>
-          <a:prstGeom prst="rect">
-            <a:avLst/>
-          </a:prstGeom>
-        </p:spPr>
-      </p:pic>
-      <p:pic>
-        <p:nvPicPr>
-          <p:cNvPr id="8" name="Picture 7">
-            <a:extLst>
-              <a:ext uri="{FF2B5EF4-FFF2-40B4-BE49-F238E27FC236}">
-                <a16:creationId xmlns:a16="http://schemas.microsoft.com/office/drawing/2014/main" id="{521C66AE-CEE1-47D8-A909-4C8F43B64BA3}"/>
-              </a:ext>
-            </a:extLst>
-          </p:cNvPr>
-          <p:cNvPicPr>
-            <a:picLocks noChangeAspect="1"/>
-          </p:cNvPicPr>
-          <p:nvPr/>
-        </p:nvPicPr>
-        <p:blipFill>
-          <a:blip r:embed="rId3"/>
-          <a:stretch>
-            <a:fillRect/>
-          </a:stretch>
-        </p:blipFill>
-        <p:spPr>
-          <a:xfrm>
-            <a:off x="-20205" y="4691784"/>
-            <a:ext cx="5578323" cy="731583"/>
-          </a:xfrm>
-          <a:prstGeom prst="rect">
-            <a:avLst/>
-          </a:prstGeom>
-        </p:spPr>
-      </p:pic>
+              <a:rPr lang="en-US" sz="1200" dirty="0"/>
+              <a:t>However,</a:t>
+            </a:r>
+          </a:p>
+          <a:p>
+            <a:pPr lvl="2"/>
+            <a:r>
+              <a:rPr lang="en-US" sz="1200" dirty="0"/>
+              <a:t>We had faced the problem in configuring the </a:t>
+            </a:r>
+            <a:r>
+              <a:rPr lang="en-US" sz="1200" dirty="0" err="1"/>
+              <a:t>logstash</a:t>
+            </a:r>
+            <a:endParaRPr lang="en-US" sz="1200" dirty="0"/>
+          </a:p>
+        </p:txBody>
+      </p:sp>
     </p:spTree>
     <p:extLst>
       <p:ext uri="{BB962C8B-B14F-4D97-AF65-F5344CB8AC3E}">
-        <p14:creationId xmlns:p14="http://schemas.microsoft.com/office/powerpoint/2010/main" val="3315469089"/>
+        <p14:creationId xmlns:p14="http://schemas.microsoft.com/office/powerpoint/2010/main" val="1721204834"/>
       </p:ext>
     </p:extLst>
   </p:cSld>
@@ -7136,19 +7090,19 @@
         </p:spPr>
         <p:txBody>
           <a:bodyPr>
-            <a:normAutofit/>
+            <a:noAutofit/>
           </a:bodyPr>
           <a:lstStyle/>
           <a:p>
             <a:r>
-              <a:rPr lang="en-US" sz="4400" dirty="0">
+              <a:rPr lang="en-US" sz="3600" dirty="0">
                 <a:solidFill>
                   <a:schemeClr val="accent6"/>
                 </a:solidFill>
               </a:rPr>
-              <a:t>Cart Service (Query)</a:t>
-            </a:r>
-            <a:endParaRPr lang="en-US" dirty="0"/>
+              <a:t>Cart Service (Command)</a:t>
+            </a:r>
+            <a:endParaRPr lang="en-US" sz="3600" dirty="0"/>
           </a:p>
         </p:txBody>
       </p:sp>
@@ -7176,7 +7130,7 @@
         </p:spPr>
         <p:txBody>
           <a:bodyPr>
-            <a:normAutofit/>
+            <a:normAutofit fontScale="92500" lnSpcReduction="20000"/>
           </a:bodyPr>
           <a:lstStyle/>
           <a:p>
@@ -7189,31 +7143,45 @@
             <a:pPr lvl="1"/>
             <a:r>
               <a:rPr lang="en-US" sz="1400" dirty="0"/>
-              <a:t>Listen to event produced by Command Cart Service</a:t>
+              <a:t>Add product</a:t>
             </a:r>
           </a:p>
           <a:p>
             <a:pPr lvl="1"/>
             <a:r>
               <a:rPr lang="en-US" sz="1400" dirty="0"/>
-              <a:t>Saves and update changes in cart to separate database</a:t>
+              <a:t>Remove product</a:t>
             </a:r>
           </a:p>
           <a:p>
             <a:pPr lvl="1"/>
             <a:r>
               <a:rPr lang="en-US" sz="1400" dirty="0"/>
-              <a:t>Handles queries related to view carts</a:t>
+              <a:t>Change quantity</a:t>
+            </a:r>
+          </a:p>
+          <a:p>
+            <a:pPr lvl="1"/>
+            <a:r>
+              <a:rPr lang="en-US" sz="1400" dirty="0"/>
+              <a:t>Checkout cart</a:t>
+            </a:r>
+          </a:p>
+          <a:p>
+            <a:pPr lvl="1"/>
+            <a:r>
+              <a:rPr lang="en-US" sz="1400" dirty="0"/>
+              <a:t>On checkout it produces the event</a:t>
             </a:r>
           </a:p>
         </p:txBody>
       </p:sp>
       <p:pic>
         <p:nvPicPr>
-          <p:cNvPr id="9" name="Picture 8">
-            <a:extLst>
-              <a:ext uri="{FF2B5EF4-FFF2-40B4-BE49-F238E27FC236}">
-                <a16:creationId xmlns:a16="http://schemas.microsoft.com/office/drawing/2014/main" id="{E247DCD6-A553-4784-A8D2-90ADFFF287B4}"/>
+          <p:cNvPr id="4" name="Picture 3">
+            <a:extLst>
+              <a:ext uri="{FF2B5EF4-FFF2-40B4-BE49-F238E27FC236}">
+                <a16:creationId xmlns:a16="http://schemas.microsoft.com/office/drawing/2014/main" id="{0729A4C3-3896-4EC8-8692-502C5CB0241C}"/>
               </a:ext>
             </a:extLst>
           </p:cNvPr>
@@ -7230,8 +7198,8 @@
         </p:blipFill>
         <p:spPr>
           <a:xfrm>
-            <a:off x="6422005" y="502024"/>
-            <a:ext cx="5303271" cy="4656323"/>
+            <a:off x="5744136" y="251292"/>
+            <a:ext cx="5867400" cy="5172075"/>
           </a:xfrm>
           <a:prstGeom prst="rect">
             <a:avLst/>
@@ -7240,10 +7208,10 @@
       </p:pic>
       <p:pic>
         <p:nvPicPr>
-          <p:cNvPr id="11" name="Picture 10">
-            <a:extLst>
-              <a:ext uri="{FF2B5EF4-FFF2-40B4-BE49-F238E27FC236}">
-                <a16:creationId xmlns:a16="http://schemas.microsoft.com/office/drawing/2014/main" id="{DB646C06-566F-4F8F-9D3F-C5E63AF96626}"/>
+          <p:cNvPr id="8" name="Picture 7">
+            <a:extLst>
+              <a:ext uri="{FF2B5EF4-FFF2-40B4-BE49-F238E27FC236}">
+                <a16:creationId xmlns:a16="http://schemas.microsoft.com/office/drawing/2014/main" id="{521C66AE-CEE1-47D8-A909-4C8F43B64BA3}"/>
               </a:ext>
             </a:extLst>
           </p:cNvPr>
@@ -7260,8 +7228,8 @@
         </p:blipFill>
         <p:spPr>
           <a:xfrm>
-            <a:off x="305048" y="2683283"/>
-            <a:ext cx="5685013" cy="777307"/>
+            <a:off x="-20205" y="4691784"/>
+            <a:ext cx="5578323" cy="731583"/>
           </a:xfrm>
           <a:prstGeom prst="rect">
             <a:avLst/>
@@ -7271,7 +7239,7 @@
     </p:spTree>
     <p:extLst>
       <p:ext uri="{BB962C8B-B14F-4D97-AF65-F5344CB8AC3E}">
-        <p14:creationId xmlns:p14="http://schemas.microsoft.com/office/powerpoint/2010/main" val="2105601947"/>
+        <p14:creationId xmlns:p14="http://schemas.microsoft.com/office/powerpoint/2010/main" val="3315469089"/>
       </p:ext>
     </p:extLst>
   </p:cSld>
@@ -7332,7 +7300,7 @@
                   <a:schemeClr val="accent6"/>
                 </a:solidFill>
               </a:rPr>
-              <a:t>Product Service</a:t>
+              <a:t>Cart Service (Query)</a:t>
             </a:r>
             <a:endParaRPr lang="en-US" dirty="0"/>
           </a:p>
@@ -7375,31 +7343,31 @@
             <a:pPr lvl="1"/>
             <a:r>
               <a:rPr lang="en-US" sz="1400" dirty="0"/>
-              <a:t>Add product</a:t>
+              <a:t>Listen to event produced by Command Cart Service</a:t>
             </a:r>
           </a:p>
           <a:p>
             <a:pPr lvl="1"/>
             <a:r>
               <a:rPr lang="en-US" sz="1400" dirty="0"/>
-              <a:t>Remove product</a:t>
+              <a:t>Saves and update changes in cart to separate database</a:t>
             </a:r>
           </a:p>
           <a:p>
             <a:pPr lvl="1"/>
             <a:r>
               <a:rPr lang="en-US" sz="1400" dirty="0"/>
-              <a:t>View product</a:t>
+              <a:t>Handles queries related to view carts</a:t>
             </a:r>
           </a:p>
         </p:txBody>
       </p:sp>
       <p:pic>
         <p:nvPicPr>
-          <p:cNvPr id="6" name="Picture 5">
-            <a:extLst>
-              <a:ext uri="{FF2B5EF4-FFF2-40B4-BE49-F238E27FC236}">
-                <a16:creationId xmlns:a16="http://schemas.microsoft.com/office/drawing/2014/main" id="{533F02F4-65E9-48EB-9B0A-9414BAA1B84D}"/>
+          <p:cNvPr id="9" name="Picture 8">
+            <a:extLst>
+              <a:ext uri="{FF2B5EF4-FFF2-40B4-BE49-F238E27FC236}">
+                <a16:creationId xmlns:a16="http://schemas.microsoft.com/office/drawing/2014/main" id="{E247DCD6-A553-4784-A8D2-90ADFFF287B4}"/>
               </a:ext>
             </a:extLst>
           </p:cNvPr>
@@ -7416,8 +7384,8 @@
         </p:blipFill>
         <p:spPr>
           <a:xfrm>
-            <a:off x="932330" y="2689796"/>
-            <a:ext cx="4969349" cy="654039"/>
+            <a:off x="6422005" y="502024"/>
+            <a:ext cx="5303271" cy="4656323"/>
           </a:xfrm>
           <a:prstGeom prst="rect">
             <a:avLst/>
@@ -7426,10 +7394,10 @@
       </p:pic>
       <p:pic>
         <p:nvPicPr>
-          <p:cNvPr id="4" name="Picture 3">
-            <a:extLst>
-              <a:ext uri="{FF2B5EF4-FFF2-40B4-BE49-F238E27FC236}">
-                <a16:creationId xmlns:a16="http://schemas.microsoft.com/office/drawing/2014/main" id="{E3DD2141-EC8B-474C-BC95-CA95829911B9}"/>
+          <p:cNvPr id="11" name="Picture 10">
+            <a:extLst>
+              <a:ext uri="{FF2B5EF4-FFF2-40B4-BE49-F238E27FC236}">
+                <a16:creationId xmlns:a16="http://schemas.microsoft.com/office/drawing/2014/main" id="{DB646C06-566F-4F8F-9D3F-C5E63AF96626}"/>
               </a:ext>
             </a:extLst>
           </p:cNvPr>
@@ -7446,8 +7414,8 @@
         </p:blipFill>
         <p:spPr>
           <a:xfrm>
-            <a:off x="6619697" y="568262"/>
-            <a:ext cx="5453559" cy="3196914"/>
+            <a:off x="305048" y="2683283"/>
+            <a:ext cx="5685013" cy="777307"/>
           </a:xfrm>
           <a:prstGeom prst="rect">
             <a:avLst/>
@@ -7457,7 +7425,7 @@
     </p:spTree>
     <p:extLst>
       <p:ext uri="{BB962C8B-B14F-4D97-AF65-F5344CB8AC3E}">
-        <p14:creationId xmlns:p14="http://schemas.microsoft.com/office/powerpoint/2010/main" val="3024283817"/>
+        <p14:creationId xmlns:p14="http://schemas.microsoft.com/office/powerpoint/2010/main" val="2105601947"/>
       </p:ext>
     </p:extLst>
   </p:cSld>
@@ -7518,7 +7486,7 @@
                   <a:schemeClr val="accent6"/>
                 </a:solidFill>
               </a:rPr>
-              <a:t>Customer Service</a:t>
+              <a:t>Product Service</a:t>
             </a:r>
             <a:endParaRPr lang="en-US" dirty="0"/>
           </a:p>
@@ -7561,31 +7529,31 @@
             <a:pPr lvl="1"/>
             <a:r>
               <a:rPr lang="en-US" sz="1400" dirty="0"/>
-              <a:t>Add Customer</a:t>
+              <a:t>Add product</a:t>
             </a:r>
           </a:p>
           <a:p>
             <a:pPr lvl="1"/>
             <a:r>
               <a:rPr lang="en-US" sz="1400" dirty="0"/>
-              <a:t>Remove Customer</a:t>
+              <a:t>Remove product</a:t>
             </a:r>
           </a:p>
           <a:p>
             <a:pPr lvl="1"/>
             <a:r>
               <a:rPr lang="en-US" sz="1400" dirty="0"/>
-              <a:t>View Customer</a:t>
+              <a:t>View product</a:t>
             </a:r>
           </a:p>
         </p:txBody>
       </p:sp>
       <p:pic>
         <p:nvPicPr>
-          <p:cNvPr id="7" name="Picture 6">
-            <a:extLst>
-              <a:ext uri="{FF2B5EF4-FFF2-40B4-BE49-F238E27FC236}">
-                <a16:creationId xmlns:a16="http://schemas.microsoft.com/office/drawing/2014/main" id="{799F814D-0B24-48D5-AA07-A233FAACD14C}"/>
+          <p:cNvPr id="6" name="Picture 5">
+            <a:extLst>
+              <a:ext uri="{FF2B5EF4-FFF2-40B4-BE49-F238E27FC236}">
+                <a16:creationId xmlns:a16="http://schemas.microsoft.com/office/drawing/2014/main" id="{533F02F4-65E9-48EB-9B0A-9414BAA1B84D}"/>
               </a:ext>
             </a:extLst>
           </p:cNvPr>
@@ -7602,8 +7570,8 @@
         </p:blipFill>
         <p:spPr>
           <a:xfrm>
-            <a:off x="5874684" y="432267"/>
-            <a:ext cx="5514975" cy="3286125"/>
+            <a:off x="932330" y="2689796"/>
+            <a:ext cx="4969349" cy="654039"/>
           </a:xfrm>
           <a:prstGeom prst="rect">
             <a:avLst/>
@@ -7612,10 +7580,10 @@
       </p:pic>
       <p:pic>
         <p:nvPicPr>
-          <p:cNvPr id="9" name="Picture 8">
-            <a:extLst>
-              <a:ext uri="{FF2B5EF4-FFF2-40B4-BE49-F238E27FC236}">
-                <a16:creationId xmlns:a16="http://schemas.microsoft.com/office/drawing/2014/main" id="{770F1225-130C-417D-AE6A-5B64B653F4A4}"/>
+          <p:cNvPr id="4" name="Picture 3">
+            <a:extLst>
+              <a:ext uri="{FF2B5EF4-FFF2-40B4-BE49-F238E27FC236}">
+                <a16:creationId xmlns:a16="http://schemas.microsoft.com/office/drawing/2014/main" id="{E3DD2141-EC8B-474C-BC95-CA95829911B9}"/>
               </a:ext>
             </a:extLst>
           </p:cNvPr>
@@ -7632,8 +7600,8 @@
         </p:blipFill>
         <p:spPr>
           <a:xfrm>
-            <a:off x="146329" y="4042156"/>
-            <a:ext cx="5624047" cy="701101"/>
+            <a:off x="6619697" y="568262"/>
+            <a:ext cx="5453559" cy="3196914"/>
           </a:xfrm>
           <a:prstGeom prst="rect">
             <a:avLst/>
@@ -7643,7 +7611,7 @@
     </p:spTree>
     <p:extLst>
       <p:ext uri="{BB962C8B-B14F-4D97-AF65-F5344CB8AC3E}">
-        <p14:creationId xmlns:p14="http://schemas.microsoft.com/office/powerpoint/2010/main" val="1980549462"/>
+        <p14:creationId xmlns:p14="http://schemas.microsoft.com/office/powerpoint/2010/main" val="3024283817"/>
       </p:ext>
     </p:extLst>
   </p:cSld>
@@ -7704,7 +7672,7 @@
                   <a:schemeClr val="accent6"/>
                 </a:solidFill>
               </a:rPr>
-              <a:t>Order Service</a:t>
+              <a:t>Customer Service</a:t>
             </a:r>
             <a:endParaRPr lang="en-US" dirty="0"/>
           </a:p>
@@ -7747,24 +7715,31 @@
             <a:pPr lvl="1"/>
             <a:r>
               <a:rPr lang="en-US" sz="1400" dirty="0"/>
-              <a:t>Create order</a:t>
+              <a:t>Add Customer</a:t>
             </a:r>
           </a:p>
           <a:p>
             <a:pPr lvl="1"/>
             <a:r>
               <a:rPr lang="en-US" sz="1400" dirty="0"/>
-              <a:t>View order</a:t>
+              <a:t>Remove Customer</a:t>
+            </a:r>
+          </a:p>
+          <a:p>
+            <a:pPr lvl="1"/>
+            <a:r>
+              <a:rPr lang="en-US" sz="1400" dirty="0"/>
+              <a:t>View Customer</a:t>
             </a:r>
           </a:p>
         </p:txBody>
       </p:sp>
       <p:pic>
         <p:nvPicPr>
-          <p:cNvPr id="4" name="Picture 3">
-            <a:extLst>
-              <a:ext uri="{FF2B5EF4-FFF2-40B4-BE49-F238E27FC236}">
-                <a16:creationId xmlns:a16="http://schemas.microsoft.com/office/drawing/2014/main" id="{BDAD711E-58EA-4CB2-B368-352EA393BCDD}"/>
+          <p:cNvPr id="7" name="Picture 6">
+            <a:extLst>
+              <a:ext uri="{FF2B5EF4-FFF2-40B4-BE49-F238E27FC236}">
+                <a16:creationId xmlns:a16="http://schemas.microsoft.com/office/drawing/2014/main" id="{799F814D-0B24-48D5-AA07-A233FAACD14C}"/>
               </a:ext>
             </a:extLst>
           </p:cNvPr>
@@ -7781,8 +7756,8 @@
         </p:blipFill>
         <p:spPr>
           <a:xfrm>
-            <a:off x="6078071" y="784606"/>
-            <a:ext cx="5448300" cy="3257550"/>
+            <a:off x="5874684" y="432267"/>
+            <a:ext cx="5514975" cy="3286125"/>
           </a:xfrm>
           <a:prstGeom prst="rect">
             <a:avLst/>
@@ -7791,10 +7766,10 @@
       </p:pic>
       <p:pic>
         <p:nvPicPr>
-          <p:cNvPr id="8" name="Picture 7">
-            <a:extLst>
-              <a:ext uri="{FF2B5EF4-FFF2-40B4-BE49-F238E27FC236}">
-                <a16:creationId xmlns:a16="http://schemas.microsoft.com/office/drawing/2014/main" id="{244AAF6A-BF53-485E-999B-60BDBB28B3D2}"/>
+          <p:cNvPr id="9" name="Picture 8">
+            <a:extLst>
+              <a:ext uri="{FF2B5EF4-FFF2-40B4-BE49-F238E27FC236}">
+                <a16:creationId xmlns:a16="http://schemas.microsoft.com/office/drawing/2014/main" id="{770F1225-130C-417D-AE6A-5B64B653F4A4}"/>
               </a:ext>
             </a:extLst>
           </p:cNvPr>
@@ -7811,8 +7786,8 @@
         </p:blipFill>
         <p:spPr>
           <a:xfrm>
-            <a:off x="194519" y="3341055"/>
-            <a:ext cx="5509737" cy="701101"/>
+            <a:off x="146329" y="4042156"/>
+            <a:ext cx="5624047" cy="701101"/>
           </a:xfrm>
           <a:prstGeom prst="rect">
             <a:avLst/>
@@ -7822,7 +7797,7 @@
     </p:spTree>
     <p:extLst>
       <p:ext uri="{BB962C8B-B14F-4D97-AF65-F5344CB8AC3E}">
-        <p14:creationId xmlns:p14="http://schemas.microsoft.com/office/powerpoint/2010/main" val="875468442"/>
+        <p14:creationId xmlns:p14="http://schemas.microsoft.com/office/powerpoint/2010/main" val="1980549462"/>
       </p:ext>
     </p:extLst>
   </p:cSld>
@@ -8001,6 +7976,185 @@
     </p:spTree>
     <p:extLst>
       <p:ext uri="{BB962C8B-B14F-4D97-AF65-F5344CB8AC3E}">
+        <p14:creationId xmlns:p14="http://schemas.microsoft.com/office/powerpoint/2010/main" val="875468442"/>
+      </p:ext>
+    </p:extLst>
+  </p:cSld>
+  <p:clrMapOvr>
+    <a:masterClrMapping/>
+  </p:clrMapOvr>
+</p:sld>
+</file>
+
+<file path=ppt/slides/slide27.xml><?xml version="1.0" encoding="utf-8"?>
+<p:sld xmlns:a="http://schemas.openxmlformats.org/drawingml/2006/main" xmlns:r="http://schemas.openxmlformats.org/officeDocument/2006/relationships" xmlns:p="http://schemas.openxmlformats.org/presentationml/2006/main" show="0">
+  <p:cSld>
+    <p:spTree>
+      <p:nvGrpSpPr>
+        <p:cNvPr id="1" name=""/>
+        <p:cNvGrpSpPr/>
+        <p:nvPr/>
+      </p:nvGrpSpPr>
+      <p:grpSpPr>
+        <a:xfrm>
+          <a:off x="0" y="0"/>
+          <a:ext cx="0" cy="0"/>
+          <a:chOff x="0" y="0"/>
+          <a:chExt cx="0" cy="0"/>
+        </a:xfrm>
+      </p:grpSpPr>
+      <p:sp>
+        <p:nvSpPr>
+          <p:cNvPr id="2" name="Title 1">
+            <a:extLst>
+              <a:ext uri="{FF2B5EF4-FFF2-40B4-BE49-F238E27FC236}">
+                <a16:creationId xmlns:a16="http://schemas.microsoft.com/office/drawing/2014/main" id="{2C9910F9-B49C-44C1-95FE-189801265D85}"/>
+              </a:ext>
+            </a:extLst>
+          </p:cNvPr>
+          <p:cNvSpPr>
+            <a:spLocks noGrp="1"/>
+          </p:cNvSpPr>
+          <p:nvPr>
+            <p:ph type="title"/>
+          </p:nvPr>
+        </p:nvSpPr>
+        <p:spPr>
+          <a:xfrm>
+            <a:off x="838200" y="170330"/>
+            <a:ext cx="4719918" cy="795864"/>
+          </a:xfrm>
+        </p:spPr>
+        <p:txBody>
+          <a:bodyPr>
+            <a:normAutofit/>
+          </a:bodyPr>
+          <a:lstStyle/>
+          <a:p>
+            <a:r>
+              <a:rPr lang="en-US" sz="4400" dirty="0">
+                <a:solidFill>
+                  <a:schemeClr val="accent6"/>
+                </a:solidFill>
+              </a:rPr>
+              <a:t>Order Service</a:t>
+            </a:r>
+            <a:endParaRPr lang="en-US" dirty="0"/>
+          </a:p>
+        </p:txBody>
+      </p:sp>
+      <p:sp>
+        <p:nvSpPr>
+          <p:cNvPr id="5" name="Content Placeholder 2">
+            <a:extLst>
+              <a:ext uri="{FF2B5EF4-FFF2-40B4-BE49-F238E27FC236}">
+                <a16:creationId xmlns:a16="http://schemas.microsoft.com/office/drawing/2014/main" id="{4C5ED415-8458-4E30-A89C-CFD27D8227AD}"/>
+              </a:ext>
+            </a:extLst>
+          </p:cNvPr>
+          <p:cNvSpPr>
+            <a:spLocks noGrp="1"/>
+          </p:cNvSpPr>
+          <p:nvPr>
+            <p:ph idx="1"/>
+          </p:nvPr>
+        </p:nvSpPr>
+        <p:spPr>
+          <a:xfrm>
+            <a:off x="838200" y="1161771"/>
+            <a:ext cx="5508812" cy="1303523"/>
+          </a:xfrm>
+        </p:spPr>
+        <p:txBody>
+          <a:bodyPr>
+            <a:normAutofit/>
+          </a:bodyPr>
+          <a:lstStyle/>
+          <a:p>
+            <a:r>
+              <a:rPr lang="en-US" sz="1800" dirty="0"/>
+              <a:t>Service to handle </a:t>
+            </a:r>
+          </a:p>
+          <a:p>
+            <a:pPr lvl="1"/>
+            <a:r>
+              <a:rPr lang="en-US" sz="1400" dirty="0"/>
+              <a:t>Create order</a:t>
+            </a:r>
+          </a:p>
+          <a:p>
+            <a:pPr lvl="1"/>
+            <a:r>
+              <a:rPr lang="en-US" sz="1400" dirty="0"/>
+              <a:t>View order</a:t>
+            </a:r>
+          </a:p>
+        </p:txBody>
+      </p:sp>
+      <p:pic>
+        <p:nvPicPr>
+          <p:cNvPr id="4" name="Picture 3">
+            <a:extLst>
+              <a:ext uri="{FF2B5EF4-FFF2-40B4-BE49-F238E27FC236}">
+                <a16:creationId xmlns:a16="http://schemas.microsoft.com/office/drawing/2014/main" id="{BDAD711E-58EA-4CB2-B368-352EA393BCDD}"/>
+              </a:ext>
+            </a:extLst>
+          </p:cNvPr>
+          <p:cNvPicPr>
+            <a:picLocks noChangeAspect="1"/>
+          </p:cNvPicPr>
+          <p:nvPr/>
+        </p:nvPicPr>
+        <p:blipFill>
+          <a:blip r:embed="rId2"/>
+          <a:stretch>
+            <a:fillRect/>
+          </a:stretch>
+        </p:blipFill>
+        <p:spPr>
+          <a:xfrm>
+            <a:off x="6078071" y="784606"/>
+            <a:ext cx="5448300" cy="3257550"/>
+          </a:xfrm>
+          <a:prstGeom prst="rect">
+            <a:avLst/>
+          </a:prstGeom>
+        </p:spPr>
+      </p:pic>
+      <p:pic>
+        <p:nvPicPr>
+          <p:cNvPr id="8" name="Picture 7">
+            <a:extLst>
+              <a:ext uri="{FF2B5EF4-FFF2-40B4-BE49-F238E27FC236}">
+                <a16:creationId xmlns:a16="http://schemas.microsoft.com/office/drawing/2014/main" id="{244AAF6A-BF53-485E-999B-60BDBB28B3D2}"/>
+              </a:ext>
+            </a:extLst>
+          </p:cNvPr>
+          <p:cNvPicPr>
+            <a:picLocks noChangeAspect="1"/>
+          </p:cNvPicPr>
+          <p:nvPr/>
+        </p:nvPicPr>
+        <p:blipFill>
+          <a:blip r:embed="rId3"/>
+          <a:stretch>
+            <a:fillRect/>
+          </a:stretch>
+        </p:blipFill>
+        <p:spPr>
+          <a:xfrm>
+            <a:off x="194519" y="3341055"/>
+            <a:ext cx="5509737" cy="701101"/>
+          </a:xfrm>
+          <a:prstGeom prst="rect">
+            <a:avLst/>
+          </a:prstGeom>
+        </p:spPr>
+      </p:pic>
+    </p:spTree>
+    <p:extLst>
+      <p:ext uri="{BB962C8B-B14F-4D97-AF65-F5344CB8AC3E}">
         <p14:creationId xmlns:p14="http://schemas.microsoft.com/office/powerpoint/2010/main" val="3370652006"/>
       </p:ext>
     </p:extLst>
@@ -8011,7 +8165,137 @@
 </p:sld>
 </file>
 
-<file path=ppt/slides/slide27.xml><?xml version="1.0" encoding="utf-8"?>
+<file path=ppt/slides/slide28.xml><?xml version="1.0" encoding="utf-8"?>
+<p:sld xmlns:a="http://schemas.openxmlformats.org/drawingml/2006/main" xmlns:r="http://schemas.openxmlformats.org/officeDocument/2006/relationships" xmlns:p="http://schemas.openxmlformats.org/presentationml/2006/main">
+  <p:cSld>
+    <p:spTree>
+      <p:nvGrpSpPr>
+        <p:cNvPr id="1" name=""/>
+        <p:cNvGrpSpPr/>
+        <p:nvPr/>
+      </p:nvGrpSpPr>
+      <p:grpSpPr>
+        <a:xfrm>
+          <a:off x="0" y="0"/>
+          <a:ext cx="0" cy="0"/>
+          <a:chOff x="0" y="0"/>
+          <a:chExt cx="0" cy="0"/>
+        </a:xfrm>
+      </p:grpSpPr>
+      <p:sp>
+        <p:nvSpPr>
+          <p:cNvPr id="2" name="Title 1">
+            <a:extLst>
+              <a:ext uri="{FF2B5EF4-FFF2-40B4-BE49-F238E27FC236}">
+                <a16:creationId xmlns:a16="http://schemas.microsoft.com/office/drawing/2014/main" id="{2C9910F9-B49C-44C1-95FE-189801265D85}"/>
+              </a:ext>
+            </a:extLst>
+          </p:cNvPr>
+          <p:cNvSpPr>
+            <a:spLocks noGrp="1"/>
+          </p:cNvSpPr>
+          <p:nvPr>
+            <p:ph type="title"/>
+          </p:nvPr>
+        </p:nvSpPr>
+        <p:spPr>
+          <a:xfrm>
+            <a:off x="838200" y="170330"/>
+            <a:ext cx="4719918" cy="795864"/>
+          </a:xfrm>
+        </p:spPr>
+        <p:txBody>
+          <a:bodyPr>
+            <a:normAutofit/>
+          </a:bodyPr>
+          <a:lstStyle/>
+          <a:p>
+            <a:r>
+              <a:rPr lang="en-US" sz="4400" dirty="0">
+                <a:solidFill>
+                  <a:schemeClr val="accent6"/>
+                </a:solidFill>
+              </a:rPr>
+              <a:t>Extension Plan</a:t>
+            </a:r>
+            <a:endParaRPr lang="en-US" dirty="0"/>
+          </a:p>
+        </p:txBody>
+      </p:sp>
+      <p:sp>
+        <p:nvSpPr>
+          <p:cNvPr id="5" name="Content Placeholder 2">
+            <a:extLst>
+              <a:ext uri="{FF2B5EF4-FFF2-40B4-BE49-F238E27FC236}">
+                <a16:creationId xmlns:a16="http://schemas.microsoft.com/office/drawing/2014/main" id="{4C5ED415-8458-4E30-A89C-CFD27D8227AD}"/>
+              </a:ext>
+            </a:extLst>
+          </p:cNvPr>
+          <p:cNvSpPr>
+            <a:spLocks noGrp="1"/>
+          </p:cNvSpPr>
+          <p:nvPr>
+            <p:ph idx="1"/>
+          </p:nvPr>
+        </p:nvSpPr>
+        <p:spPr>
+          <a:xfrm>
+            <a:off x="838200" y="1161771"/>
+            <a:ext cx="10080812" cy="3248864"/>
+          </a:xfrm>
+        </p:spPr>
+        <p:txBody>
+          <a:bodyPr>
+            <a:normAutofit/>
+          </a:bodyPr>
+          <a:lstStyle/>
+          <a:p>
+            <a:r>
+              <a:rPr lang="en-US" sz="1800" dirty="0"/>
+              <a:t>Integration of Authentication Server</a:t>
+            </a:r>
+          </a:p>
+          <a:p>
+            <a:r>
+              <a:rPr lang="en-US" sz="1800" dirty="0"/>
+              <a:t>Integration of product category</a:t>
+            </a:r>
+          </a:p>
+          <a:p>
+            <a:r>
+              <a:rPr lang="en-US" sz="1800" dirty="0"/>
+              <a:t>Integration of the payment system</a:t>
+            </a:r>
+          </a:p>
+          <a:p>
+            <a:r>
+              <a:rPr lang="en-US" sz="1800" dirty="0"/>
+              <a:t>Integration of the email services</a:t>
+            </a:r>
+          </a:p>
+          <a:p>
+            <a:r>
+              <a:rPr lang="en-US" sz="1800" dirty="0"/>
+              <a:t>Integration of front end view via react, and so on</a:t>
+            </a:r>
+            <a:endParaRPr lang="en-US" sz="1400" dirty="0"/>
+          </a:p>
+        </p:txBody>
+      </p:sp>
+    </p:spTree>
+    <p:extLst>
+      <p:ext uri="{BB962C8B-B14F-4D97-AF65-F5344CB8AC3E}">
+        <p14:creationId xmlns:p14="http://schemas.microsoft.com/office/powerpoint/2010/main" val="1039333271"/>
+      </p:ext>
+    </p:extLst>
+  </p:cSld>
+  <p:clrMapOvr>
+    <a:masterClrMapping/>
+  </p:clrMapOvr>
+</p:sld>
+</file>
+
+<file path=ppt/slides/slide29.xml><?xml version="1.0" encoding="utf-8"?>
 <p:sld xmlns:a="http://schemas.openxmlformats.org/drawingml/2006/main" xmlns:r="http://schemas.openxmlformats.org/officeDocument/2006/relationships" xmlns:p="http://schemas.openxmlformats.org/presentationml/2006/main">
   <p:cSld>
     <p:spTree>
@@ -8887,7 +9171,7 @@
 </file>
 
 <file path=ppt/slides/slide8.xml><?xml version="1.0" encoding="utf-8"?>
-<p:sld xmlns:a="http://schemas.openxmlformats.org/drawingml/2006/main" xmlns:r="http://schemas.openxmlformats.org/officeDocument/2006/relationships" xmlns:p="http://schemas.openxmlformats.org/presentationml/2006/main">
+<p:sld xmlns:a="http://schemas.openxmlformats.org/drawingml/2006/main" xmlns:r="http://schemas.openxmlformats.org/officeDocument/2006/relationships" xmlns:p="http://schemas.openxmlformats.org/presentationml/2006/main" show="0">
   <p:cSld>
     <p:spTree>
       <p:nvGrpSpPr>

</xml_diff>